<commit_message>
Project: add more results to presentation
</commit_message>
<xml_diff>
--- a/Project/Documantation/Presentation1.pptx
+++ b/Project/Documantation/Presentation1.pptx
@@ -17,7 +17,10 @@
     <p:sldId id="268" r:id="rId11"/>
     <p:sldId id="272" r:id="rId12"/>
     <p:sldId id="270" r:id="rId13"/>
-    <p:sldId id="271" r:id="rId14"/>
+    <p:sldId id="273" r:id="rId14"/>
+    <p:sldId id="275" r:id="rId15"/>
+    <p:sldId id="277" r:id="rId16"/>
+    <p:sldId id="271" r:id="rId17"/>
   </p:sldIdLst>
   <p:sldSz cx="9144000" cy="6858000" type="screen4x3"/>
   <p:notesSz cx="6858000" cy="9144000"/>
@@ -304,7 +307,7 @@
           <a:p>
             <a:fld id="{F50986C9-577D-4FB0-A2A6-9CC1B39E019D}" type="datetimeFigureOut">
               <a:rPr lang="he-IL" smtClean="0"/>
-              <a:t>ח'/תמוז/תשע"ג</a:t>
+              <a:t>ט'/תמוז/תשע"ג</a:t>
             </a:fld>
             <a:endParaRPr lang="he-IL"/>
           </a:p>
@@ -481,7 +484,7 @@
           <a:p>
             <a:fld id="{F50986C9-577D-4FB0-A2A6-9CC1B39E019D}" type="datetimeFigureOut">
               <a:rPr lang="he-IL" smtClean="0"/>
-              <a:t>ח'/תמוז/תשע"ג</a:t>
+              <a:t>ט'/תמוז/תשע"ג</a:t>
             </a:fld>
             <a:endParaRPr lang="he-IL"/>
           </a:p>
@@ -663,7 +666,7 @@
           <a:p>
             <a:fld id="{F50986C9-577D-4FB0-A2A6-9CC1B39E019D}" type="datetimeFigureOut">
               <a:rPr lang="he-IL" smtClean="0"/>
-              <a:t>ח'/תמוז/תשע"ג</a:t>
+              <a:t>ט'/תמוז/תשע"ג</a:t>
             </a:fld>
             <a:endParaRPr lang="he-IL"/>
           </a:p>
@@ -872,7 +875,7 @@
           <a:p>
             <a:fld id="{F50986C9-577D-4FB0-A2A6-9CC1B39E019D}" type="datetimeFigureOut">
               <a:rPr lang="he-IL" smtClean="0"/>
-              <a:t>ח'/תמוז/תשע"ג</a:t>
+              <a:t>ט'/תמוז/תשע"ג</a:t>
             </a:fld>
             <a:endParaRPr lang="he-IL"/>
           </a:p>
@@ -1120,7 +1123,7 @@
           <a:p>
             <a:fld id="{F50986C9-577D-4FB0-A2A6-9CC1B39E019D}" type="datetimeFigureOut">
               <a:rPr lang="he-IL" smtClean="0"/>
-              <a:t>ח'/תמוז/תשע"ג</a:t>
+              <a:t>ט'/תמוז/תשע"ג</a:t>
             </a:fld>
             <a:endParaRPr lang="he-IL"/>
           </a:p>
@@ -1437,7 +1440,7 @@
           <a:p>
             <a:fld id="{F50986C9-577D-4FB0-A2A6-9CC1B39E019D}" type="datetimeFigureOut">
               <a:rPr lang="he-IL" smtClean="0"/>
-              <a:t>ח'/תמוז/תשע"ג</a:t>
+              <a:t>ט'/תמוז/תשע"ג</a:t>
             </a:fld>
             <a:endParaRPr lang="he-IL"/>
           </a:p>
@@ -1887,7 +1890,7 @@
           <a:p>
             <a:fld id="{F50986C9-577D-4FB0-A2A6-9CC1B39E019D}" type="datetimeFigureOut">
               <a:rPr lang="he-IL" smtClean="0"/>
-              <a:t>ח'/תמוז/תשע"ג</a:t>
+              <a:t>ט'/תמוז/תשע"ג</a:t>
             </a:fld>
             <a:endParaRPr lang="he-IL"/>
           </a:p>
@@ -2007,7 +2010,7 @@
           <a:p>
             <a:fld id="{F50986C9-577D-4FB0-A2A6-9CC1B39E019D}" type="datetimeFigureOut">
               <a:rPr lang="he-IL" smtClean="0"/>
-              <a:t>ח'/תמוז/תשע"ג</a:t>
+              <a:t>ט'/תמוז/תשע"ג</a:t>
             </a:fld>
             <a:endParaRPr lang="he-IL"/>
           </a:p>
@@ -2104,7 +2107,7 @@
           <a:p>
             <a:fld id="{F50986C9-577D-4FB0-A2A6-9CC1B39E019D}" type="datetimeFigureOut">
               <a:rPr lang="he-IL" smtClean="0"/>
-              <a:t>ח'/תמוז/תשע"ג</a:t>
+              <a:t>ט'/תמוז/תשע"ג</a:t>
             </a:fld>
             <a:endParaRPr lang="he-IL"/>
           </a:p>
@@ -2396,7 +2399,7 @@
           <a:p>
             <a:fld id="{F50986C9-577D-4FB0-A2A6-9CC1B39E019D}" type="datetimeFigureOut">
               <a:rPr lang="he-IL" smtClean="0"/>
-              <a:t>ח'/תמוז/תשע"ג</a:t>
+              <a:t>ט'/תמוז/תשע"ג</a:t>
             </a:fld>
             <a:endParaRPr lang="he-IL"/>
           </a:p>
@@ -2594,7 +2597,7 @@
           <a:p>
             <a:fld id="{F50986C9-577D-4FB0-A2A6-9CC1B39E019D}" type="datetimeFigureOut">
               <a:rPr lang="he-IL" smtClean="0"/>
-              <a:t>ח'/תמוז/תשע"ג</a:t>
+              <a:t>ט'/תמוז/תשע"ג</a:t>
             </a:fld>
             <a:endParaRPr lang="he-IL"/>
           </a:p>
@@ -7152,7 +7155,7 @@
           <a:p>
             <a:fld id="{F50986C9-577D-4FB0-A2A6-9CC1B39E019D}" type="datetimeFigureOut">
               <a:rPr lang="he-IL" smtClean="0"/>
-              <a:t>ח'/תמוז/תשע"ג</a:t>
+              <a:t>ט'/תמוז/תשע"ג</a:t>
             </a:fld>
             <a:endParaRPr lang="he-IL"/>
           </a:p>
@@ -10782,16 +10785,6 @@
                 </a:solidFill>
               </a14:hiddenFill>
             </a:ext>
-            <a:ext uri="{91240B29-F687-4F45-9708-019B960494DF}">
-              <a14:hiddenLine xmlns:a14="http://schemas.microsoft.com/office/drawing/2010/main" w="9525">
-                <a:solidFill>
-                  <a:schemeClr val="tx1"/>
-                </a:solidFill>
-                <a:miter lim="800000"/>
-                <a:headEnd/>
-                <a:tailEnd/>
-              </a14:hiddenLine>
-            </a:ext>
           </a:extLst>
         </p:spPr>
       </p:pic>
@@ -10857,25 +10850,7 @@
               <a:srgbClr val="FFFFFF"/>
             </a:contourClr>
           </a:sp3d>
-          <a:extLst>
-            <a:ext uri="{909E8E84-426E-40DD-AFC4-6F175D3DCCD1}">
-              <a14:hiddenFill xmlns:a14="http://schemas.microsoft.com/office/drawing/2010/main">
-                <a:solidFill>
-                  <a:schemeClr val="accent1"/>
-                </a:solidFill>
-              </a14:hiddenFill>
-            </a:ext>
-            <a:ext uri="{91240B29-F687-4F45-9708-019B960494DF}">
-              <a14:hiddenLine xmlns:a14="http://schemas.microsoft.com/office/drawing/2010/main" w="9525">
-                <a:solidFill>
-                  <a:schemeClr val="tx1"/>
-                </a:solidFill>
-                <a:miter lim="800000"/>
-                <a:headEnd/>
-                <a:tailEnd/>
-              </a14:hiddenLine>
-            </a:ext>
-          </a:extLst>
+          <a:extLst/>
         </p:spPr>
       </p:pic>
       <p:pic>
@@ -10966,6 +10941,377 @@
 </file>
 
 <file path=ppt/slides/slide13.xml><?xml version="1.0" encoding="utf-8"?>
+<p:sld xmlns:a="http://schemas.openxmlformats.org/drawingml/2006/main" xmlns:r="http://schemas.openxmlformats.org/officeDocument/2006/relationships" xmlns:p="http://schemas.openxmlformats.org/presentationml/2006/main">
+  <p:cSld>
+    <p:spTree>
+      <p:nvGrpSpPr>
+        <p:cNvPr id="1" name=""/>
+        <p:cNvGrpSpPr/>
+        <p:nvPr/>
+      </p:nvGrpSpPr>
+      <p:grpSpPr>
+        <a:xfrm>
+          <a:off x="0" y="0"/>
+          <a:ext cx="0" cy="0"/>
+          <a:chOff x="0" y="0"/>
+          <a:chExt cx="0" cy="0"/>
+        </a:xfrm>
+      </p:grpSpPr>
+      <p:pic>
+        <p:nvPicPr>
+          <p:cNvPr id="7171" name="Picture 3" descr="D:\CloudServices\Dropbox\Haim And Zahi Shared\University\Courses\Imaging and Color Technologies\Results\Paper Daltonize NO Enegry\Rainbow Fishes__iter1111_edge6_NoEnergy.jpg"/>
+          <p:cNvPicPr>
+            <a:picLocks noChangeAspect="1" noChangeArrowheads="1"/>
+          </p:cNvPicPr>
+          <p:nvPr/>
+        </p:nvPicPr>
+        <p:blipFill rotWithShape="1">
+          <a:blip r:embed="rId2">
+            <a:extLst>
+              <a:ext uri="{28A0092B-C50C-407E-A947-70E740481C1C}">
+                <a14:useLocalDpi xmlns:a14="http://schemas.microsoft.com/office/drawing/2010/main" val="0"/>
+              </a:ext>
+            </a:extLst>
+          </a:blip>
+          <a:srcRect l="12982" t="5389" r="9589" b="13131"/>
+          <a:stretch/>
+        </p:blipFill>
+        <p:spPr bwMode="auto">
+          <a:xfrm>
+            <a:off x="4283968" y="188641"/>
+            <a:ext cx="4744234" cy="3744416"/>
+          </a:xfrm>
+          <a:prstGeom prst="snip2DiagRect">
+            <a:avLst/>
+          </a:prstGeom>
+          <a:solidFill>
+            <a:srgbClr val="FFFFFF">
+              <a:shade val="85000"/>
+            </a:srgbClr>
+          </a:solidFill>
+          <a:ln w="88900" cap="sq">
+            <a:solidFill>
+              <a:srgbClr val="FFFFFF"/>
+            </a:solidFill>
+            <a:miter lim="800000"/>
+          </a:ln>
+          <a:effectLst>
+            <a:outerShdw blurRad="88900" algn="tl" rotWithShape="0">
+              <a:srgbClr val="000000">
+                <a:alpha val="45000"/>
+              </a:srgbClr>
+            </a:outerShdw>
+          </a:effectLst>
+          <a:scene3d>
+            <a:camera prst="orthographicFront"/>
+            <a:lightRig rig="twoPt" dir="t">
+              <a:rot lat="0" lon="0" rev="7200000"/>
+            </a:lightRig>
+          </a:scene3d>
+          <a:sp3d>
+            <a:bevelT w="25400" h="19050"/>
+            <a:contourClr>
+              <a:srgbClr val="FFFFFF"/>
+            </a:contourClr>
+          </a:sp3d>
+          <a:extLst>
+            <a:ext uri="{909E8E84-426E-40DD-AFC4-6F175D3DCCD1}">
+              <a14:hiddenFill xmlns:a14="http://schemas.microsoft.com/office/drawing/2010/main">
+                <a:solidFill>
+                  <a:srgbClr val="FFFFFF"/>
+                </a:solidFill>
+              </a14:hiddenFill>
+            </a:ext>
+          </a:extLst>
+        </p:spPr>
+      </p:pic>
+      <p:pic>
+        <p:nvPicPr>
+          <p:cNvPr id="6" name="Picture 2" descr="D:\CloudServices\Dropbox\Haim And Zahi Shared\University\Courses\Imaging and Color Technologies\Results\Paper Daltonize NO Enegry\images__iter1127_edge6_NoEnergy.jpg"/>
+          <p:cNvPicPr>
+            <a:picLocks noChangeAspect="1" noChangeArrowheads="1"/>
+          </p:cNvPicPr>
+          <p:nvPr/>
+        </p:nvPicPr>
+        <p:blipFill rotWithShape="1">
+          <a:blip r:embed="rId3">
+            <a:extLst>
+              <a:ext uri="{28A0092B-C50C-407E-A947-70E740481C1C}">
+                <a14:useLocalDpi xmlns:a14="http://schemas.microsoft.com/office/drawing/2010/main" val="0"/>
+              </a:ext>
+            </a:extLst>
+          </a:blip>
+          <a:srcRect l="10976" t="4846" r="7568" b="12181"/>
+          <a:stretch/>
+        </p:blipFill>
+        <p:spPr bwMode="auto">
+          <a:xfrm>
+            <a:off x="0" y="2461641"/>
+            <a:ext cx="5370185" cy="4102688"/>
+          </a:xfrm>
+          <a:prstGeom prst="rect">
+            <a:avLst/>
+          </a:prstGeom>
+          <a:ln>
+            <a:noFill/>
+          </a:ln>
+          <a:effectLst>
+            <a:reflection blurRad="12700" stA="30000" endPos="30000" dist="5000" dir="5400000" sy="-100000" algn="bl" rotWithShape="0"/>
+          </a:effectLst>
+          <a:scene3d>
+            <a:camera prst="perspectiveContrastingLeftFacing">
+              <a:rot lat="300000" lon="19800000" rev="0"/>
+            </a:camera>
+            <a:lightRig rig="threePt" dir="t">
+              <a:rot lat="0" lon="0" rev="2700000"/>
+            </a:lightRig>
+          </a:scene3d>
+          <a:sp3d>
+            <a:bevelT w="63500" h="50800"/>
+          </a:sp3d>
+          <a:extLst>
+            <a:ext uri="{909E8E84-426E-40DD-AFC4-6F175D3DCCD1}">
+              <a14:hiddenFill xmlns:a14="http://schemas.microsoft.com/office/drawing/2010/main">
+                <a:solidFill>
+                  <a:srgbClr val="FFFFFF"/>
+                </a:solidFill>
+              </a14:hiddenFill>
+            </a:ext>
+          </a:extLst>
+        </p:spPr>
+      </p:pic>
+    </p:spTree>
+    <p:extLst>
+      <p:ext uri="{BB962C8B-B14F-4D97-AF65-F5344CB8AC3E}">
+        <p14:creationId xmlns:p14="http://schemas.microsoft.com/office/powerpoint/2010/main" val="4262178434"/>
+      </p:ext>
+    </p:extLst>
+  </p:cSld>
+  <p:clrMapOvr>
+    <a:masterClrMapping/>
+  </p:clrMapOvr>
+</p:sld>
+</file>
+
+<file path=ppt/slides/slide14.xml><?xml version="1.0" encoding="utf-8"?>
+<p:sld xmlns:a="http://schemas.openxmlformats.org/drawingml/2006/main" xmlns:r="http://schemas.openxmlformats.org/officeDocument/2006/relationships" xmlns:p="http://schemas.openxmlformats.org/presentationml/2006/main">
+  <p:cSld>
+    <p:spTree>
+      <p:nvGrpSpPr>
+        <p:cNvPr id="1" name=""/>
+        <p:cNvGrpSpPr/>
+        <p:nvPr/>
+      </p:nvGrpSpPr>
+      <p:grpSpPr>
+        <a:xfrm>
+          <a:off x="0" y="0"/>
+          <a:ext cx="0" cy="0"/>
+          <a:chOff x="0" y="0"/>
+          <a:chExt cx="0" cy="0"/>
+        </a:xfrm>
+      </p:grpSpPr>
+      <p:sp>
+        <p:nvSpPr>
+          <p:cNvPr id="2" name="Title 1"/>
+          <p:cNvSpPr>
+            <a:spLocks noGrp="1"/>
+          </p:cNvSpPr>
+          <p:nvPr>
+            <p:ph type="title"/>
+          </p:nvPr>
+        </p:nvSpPr>
+        <p:spPr/>
+        <p:txBody>
+          <a:bodyPr/>
+          <a:lstStyle/>
+          <a:p>
+            <a:endParaRPr lang="he-IL"/>
+          </a:p>
+        </p:txBody>
+      </p:sp>
+      <p:sp>
+        <p:nvSpPr>
+          <p:cNvPr id="3" name="Content Placeholder 2"/>
+          <p:cNvSpPr>
+            <a:spLocks noGrp="1"/>
+          </p:cNvSpPr>
+          <p:nvPr>
+            <p:ph idx="1"/>
+          </p:nvPr>
+        </p:nvSpPr>
+        <p:spPr/>
+        <p:txBody>
+          <a:bodyPr/>
+          <a:lstStyle/>
+          <a:p>
+            <a:endParaRPr lang="he-IL"/>
+          </a:p>
+        </p:txBody>
+      </p:sp>
+      <p:pic>
+        <p:nvPicPr>
+          <p:cNvPr id="4098" name="Picture 2" descr="D:\CloudServices\Dropbox\Haim And Zahi Shared\University\Courses\Imaging and Color Technologies\Results\Paper Daltonize NO Enegry\Gaugin_original_small__iter1129_edge6_NoEnergy.jpg"/>
+          <p:cNvPicPr>
+            <a:picLocks noChangeAspect="1" noChangeArrowheads="1"/>
+          </p:cNvPicPr>
+          <p:nvPr/>
+        </p:nvPicPr>
+        <p:blipFill>
+          <a:blip r:embed="rId2">
+            <a:extLst>
+              <a:ext uri="{28A0092B-C50C-407E-A947-70E740481C1C}">
+                <a14:useLocalDpi xmlns:a14="http://schemas.microsoft.com/office/drawing/2010/main" val="0"/>
+              </a:ext>
+            </a:extLst>
+          </a:blip>
+          <a:srcRect/>
+          <a:stretch>
+            <a:fillRect/>
+          </a:stretch>
+        </p:blipFill>
+        <p:spPr bwMode="auto">
+          <a:xfrm>
+            <a:off x="467544" y="386662"/>
+            <a:ext cx="8280920" cy="6210690"/>
+          </a:xfrm>
+          <a:prstGeom prst="rect">
+            <a:avLst/>
+          </a:prstGeom>
+          <a:noFill/>
+          <a:extLst>
+            <a:ext uri="{909E8E84-426E-40DD-AFC4-6F175D3DCCD1}">
+              <a14:hiddenFill xmlns:a14="http://schemas.microsoft.com/office/drawing/2010/main">
+                <a:solidFill>
+                  <a:srgbClr val="FFFFFF"/>
+                </a:solidFill>
+              </a14:hiddenFill>
+            </a:ext>
+          </a:extLst>
+        </p:spPr>
+      </p:pic>
+    </p:spTree>
+    <p:extLst>
+      <p:ext uri="{BB962C8B-B14F-4D97-AF65-F5344CB8AC3E}">
+        <p14:creationId xmlns:p14="http://schemas.microsoft.com/office/powerpoint/2010/main" val="2189356691"/>
+      </p:ext>
+    </p:extLst>
+  </p:cSld>
+  <p:clrMapOvr>
+    <a:masterClrMapping/>
+  </p:clrMapOvr>
+</p:sld>
+</file>
+
+<file path=ppt/slides/slide15.xml><?xml version="1.0" encoding="utf-8"?>
+<p:sld xmlns:a="http://schemas.openxmlformats.org/drawingml/2006/main" xmlns:r="http://schemas.openxmlformats.org/officeDocument/2006/relationships" xmlns:p="http://schemas.openxmlformats.org/presentationml/2006/main">
+  <p:cSld>
+    <p:spTree>
+      <p:nvGrpSpPr>
+        <p:cNvPr id="1" name=""/>
+        <p:cNvGrpSpPr/>
+        <p:nvPr/>
+      </p:nvGrpSpPr>
+      <p:grpSpPr>
+        <a:xfrm>
+          <a:off x="0" y="0"/>
+          <a:ext cx="0" cy="0"/>
+          <a:chOff x="0" y="0"/>
+          <a:chExt cx="0" cy="0"/>
+        </a:xfrm>
+      </p:grpSpPr>
+      <p:sp>
+        <p:nvSpPr>
+          <p:cNvPr id="2" name="Title 1"/>
+          <p:cNvSpPr>
+            <a:spLocks noGrp="1"/>
+          </p:cNvSpPr>
+          <p:nvPr>
+            <p:ph type="title"/>
+          </p:nvPr>
+        </p:nvSpPr>
+        <p:spPr/>
+        <p:txBody>
+          <a:bodyPr/>
+          <a:lstStyle/>
+          <a:p>
+            <a:endParaRPr lang="he-IL"/>
+          </a:p>
+        </p:txBody>
+      </p:sp>
+      <p:sp>
+        <p:nvSpPr>
+          <p:cNvPr id="3" name="Content Placeholder 2"/>
+          <p:cNvSpPr>
+            <a:spLocks noGrp="1"/>
+          </p:cNvSpPr>
+          <p:nvPr>
+            <p:ph idx="1"/>
+          </p:nvPr>
+        </p:nvSpPr>
+        <p:spPr/>
+        <p:txBody>
+          <a:bodyPr/>
+          <a:lstStyle/>
+          <a:p>
+            <a:endParaRPr lang="he-IL" dirty="0"/>
+          </a:p>
+        </p:txBody>
+      </p:sp>
+      <p:pic>
+        <p:nvPicPr>
+          <p:cNvPr id="2050" name="Picture 2" descr="D:\CloudServices\Dropbox\Haim And Zahi Shared\University\Courses\Imaging and Color Technologies\Results\Paper Daltonize NO Enegry\berries normal__iter1194_edge4_NoEnergy.jpg"/>
+          <p:cNvPicPr>
+            <a:picLocks noChangeAspect="1" noChangeArrowheads="1"/>
+          </p:cNvPicPr>
+          <p:nvPr/>
+        </p:nvPicPr>
+        <p:blipFill>
+          <a:blip r:embed="rId2">
+            <a:extLst>
+              <a:ext uri="{28A0092B-C50C-407E-A947-70E740481C1C}">
+                <a14:useLocalDpi xmlns:a14="http://schemas.microsoft.com/office/drawing/2010/main" val="0"/>
+              </a:ext>
+            </a:extLst>
+          </a:blip>
+          <a:srcRect/>
+          <a:stretch>
+            <a:fillRect/>
+          </a:stretch>
+        </p:blipFill>
+        <p:spPr bwMode="auto">
+          <a:xfrm>
+            <a:off x="414808" y="347109"/>
+            <a:ext cx="8333656" cy="6250243"/>
+          </a:xfrm>
+          <a:prstGeom prst="rect">
+            <a:avLst/>
+          </a:prstGeom>
+          <a:noFill/>
+          <a:extLst>
+            <a:ext uri="{909E8E84-426E-40DD-AFC4-6F175D3DCCD1}">
+              <a14:hiddenFill xmlns:a14="http://schemas.microsoft.com/office/drawing/2010/main">
+                <a:solidFill>
+                  <a:srgbClr val="FFFFFF"/>
+                </a:solidFill>
+              </a14:hiddenFill>
+            </a:ext>
+          </a:extLst>
+        </p:spPr>
+      </p:pic>
+    </p:spTree>
+    <p:extLst>
+      <p:ext uri="{BB962C8B-B14F-4D97-AF65-F5344CB8AC3E}">
+        <p14:creationId xmlns:p14="http://schemas.microsoft.com/office/powerpoint/2010/main" val="1577113273"/>
+      </p:ext>
+    </p:extLst>
+  </p:cSld>
+  <p:clrMapOvr>
+    <a:masterClrMapping/>
+  </p:clrMapOvr>
+</p:sld>
+</file>
+
+<file path=ppt/slides/slide16.xml><?xml version="1.0" encoding="utf-8"?>
 <p:sld xmlns:a="http://schemas.openxmlformats.org/drawingml/2006/main" xmlns:r="http://schemas.openxmlformats.org/officeDocument/2006/relationships" xmlns:p="http://schemas.openxmlformats.org/presentationml/2006/main">
   <p:cSld>
     <p:spTree>

</xml_diff>